<commit_message>
Change wrongly typed course code
</commit_message>
<xml_diff>
--- a/Documentation/Presentations/ProjectPresentation.pptx
+++ b/Documentation/Presentations/ProjectPresentation.pptx
@@ -471,7 +471,7 @@
             <a:fld id="{1C2C028D-D82E-4625-BB20-3E4C6D430823}" type="datetime1">
               <a:rPr lang="it-IT"/>
               <a:pPr lvl="0"/>
-              <a:t>26/09/2018</a:t>
+              <a:t>27/09/2018</a:t>
             </a:fld>
             <a:endParaRPr lang="it-IT"/>
           </a:p>
@@ -700,7 +700,7 @@
           <a:p>
             <a:pPr lvl="0"/>
             <a:fld id="{DE9F76D5-ABBB-4301-8EC0-CC14855BFC2C}" type="slidenum">
-              <a:t>‹N°›</a:t>
+              <a:t>‹#›</a:t>
             </a:fld>
             <a:endParaRPr lang="it-IT"/>
           </a:p>
@@ -827,7 +827,7 @@
             <a:fld id="{10235A90-F9E2-4BE9-8A8C-BEDA9E68D9D1}" type="datetime1">
               <a:rPr lang="en-US"/>
               <a:pPr lvl="0"/>
-              <a:t>9/26/2018</a:t>
+              <a:t>9/27/2018</a:t>
             </a:fld>
             <a:endParaRPr lang="en-US"/>
           </a:p>
@@ -1056,7 +1056,7 @@
           <a:p>
             <a:pPr lvl="0"/>
             <a:fld id="{B242DCC2-5E44-4553-9430-49EA96EB87EF}" type="slidenum">
-              <a:t>‹N°›</a:t>
+              <a:t>‹#›</a:t>
             </a:fld>
             <a:endParaRPr lang="en-US"/>
           </a:p>
@@ -1183,7 +1183,7 @@
             <a:fld id="{D01E84A2-EE2E-45F7-8405-43D8DFC76415}" type="datetime1">
               <a:rPr lang="en-US"/>
               <a:pPr lvl="0"/>
-              <a:t>9/26/2018</a:t>
+              <a:t>9/27/2018</a:t>
             </a:fld>
             <a:endParaRPr lang="en-US"/>
           </a:p>
@@ -1412,7 +1412,7 @@
           <a:p>
             <a:pPr lvl="0"/>
             <a:fld id="{F560ADD7-D8A7-4202-976E-9C27A2A04A4F}" type="slidenum">
-              <a:t>‹N°›</a:t>
+              <a:t>‹#›</a:t>
             </a:fld>
             <a:endParaRPr lang="en-US"/>
           </a:p>
@@ -9763,7 +9763,7 @@
             <a:fld id="{EAFB61CF-7F66-4FB7-B55D-C33F673E57C2}" type="datetime1">
               <a:rPr lang="en-US"/>
               <a:pPr lvl="0"/>
-              <a:t>9/26/2018</a:t>
+              <a:t>9/27/2018</a:t>
             </a:fld>
             <a:endParaRPr lang="en-US"/>
           </a:p>
@@ -9836,7 +9836,7 @@
           <a:p>
             <a:pPr lvl="0"/>
             <a:fld id="{A262C923-3567-4817-89B2-AAB4ED11EE44}" type="slidenum">
-              <a:t>‹N°›</a:t>
+              <a:t>‹#›</a:t>
             </a:fld>
             <a:endParaRPr lang="en-US"/>
           </a:p>
@@ -10036,7 +10036,7 @@
             <a:fld id="{BEF35DF6-0554-4C5C-A9C8-B78B2F51B124}" type="datetime1">
               <a:rPr lang="en-US"/>
               <a:pPr lvl="0"/>
-              <a:t>9/26/2018</a:t>
+              <a:t>9/27/2018</a:t>
             </a:fld>
             <a:endParaRPr lang="en-US"/>
           </a:p>
@@ -10099,7 +10099,7 @@
           <a:p>
             <a:pPr lvl="0"/>
             <a:fld id="{5CB19BF5-D3D1-40DC-A93D-A87F4B28AE53}" type="slidenum">
-              <a:t>‹N°›</a:t>
+              <a:t>‹#›</a:t>
             </a:fld>
             <a:endParaRPr lang="en-US"/>
           </a:p>
@@ -10242,7 +10242,7 @@
             <a:fld id="{58165CA2-8D86-407D-B337-AB3F8F1C2204}" type="datetime1">
               <a:rPr lang="en-US"/>
               <a:pPr lvl="0"/>
-              <a:t>9/26/2018</a:t>
+              <a:t>9/27/2018</a:t>
             </a:fld>
             <a:endParaRPr lang="en-US"/>
           </a:p>
@@ -10305,7 +10305,7 @@
           <a:p>
             <a:pPr lvl="0"/>
             <a:fld id="{7D0A6F8A-5A23-4503-9B71-A79B29728402}" type="slidenum">
-              <a:t>‹N°›</a:t>
+              <a:t>‹#›</a:t>
             </a:fld>
             <a:endParaRPr lang="en-US"/>
           </a:p>
@@ -10487,7 +10487,7 @@
             <a:fld id="{2CB577AD-FC84-4D5C-9B69-CB757F013E83}" type="datetime1">
               <a:rPr lang="en-US"/>
               <a:pPr lvl="0"/>
-              <a:t>9/26/2018</a:t>
+              <a:t>9/27/2018</a:t>
             </a:fld>
             <a:endParaRPr lang="en-US"/>
           </a:p>
@@ -10550,7 +10550,7 @@
           <a:p>
             <a:pPr lvl="0"/>
             <a:fld id="{78E6AA32-1C87-446F-9FBA-A08FB7817B78}" type="slidenum">
-              <a:t>‹N°›</a:t>
+              <a:t>‹#›</a:t>
             </a:fld>
             <a:endParaRPr lang="en-US"/>
           </a:p>
@@ -10821,7 +10821,7 @@
             <a:fld id="{AFFF1DAB-FEBB-46AC-974E-0E93B79F4301}" type="datetime1">
               <a:rPr lang="en-US"/>
               <a:pPr lvl="0"/>
-              <a:t>9/26/2018</a:t>
+              <a:t>9/27/2018</a:t>
             </a:fld>
             <a:endParaRPr lang="en-US"/>
           </a:p>
@@ -10884,7 +10884,7 @@
           <a:p>
             <a:pPr lvl="0"/>
             <a:fld id="{70CD4967-E80D-4DAC-9428-82F31DB753D5}" type="slidenum">
-              <a:t>‹N°›</a:t>
+              <a:t>‹#›</a:t>
             </a:fld>
             <a:endParaRPr lang="en-US"/>
           </a:p>
@@ -11237,7 +11237,7 @@
             <a:fld id="{67026634-CA81-4644-AC74-2B526300646E}" type="datetime1">
               <a:rPr lang="en-US"/>
               <a:pPr lvl="0"/>
-              <a:t>9/26/2018</a:t>
+              <a:t>9/27/2018</a:t>
             </a:fld>
             <a:endParaRPr lang="en-US"/>
           </a:p>
@@ -11300,7 +11300,7 @@
           <a:p>
             <a:pPr lvl="0"/>
             <a:fld id="{C5361408-C7A9-461C-85C8-29C9C3C7E71E}" type="slidenum">
-              <a:t>‹N°›</a:t>
+              <a:t>‹#›</a:t>
             </a:fld>
             <a:endParaRPr lang="en-US"/>
           </a:p>
@@ -11821,7 +11821,7 @@
             <a:fld id="{B2BA7B79-ADDB-49AC-867C-B1DC54EA9459}" type="datetime1">
               <a:rPr lang="en-US"/>
               <a:pPr lvl="0"/>
-              <a:t>9/26/2018</a:t>
+              <a:t>9/27/2018</a:t>
             </a:fld>
             <a:endParaRPr lang="en-US"/>
           </a:p>
@@ -11884,7 +11884,7 @@
           <a:p>
             <a:pPr lvl="0"/>
             <a:fld id="{61C3839B-8EDD-4CEF-9FF8-43C39E5CA24E}" type="slidenum">
-              <a:t>‹N°›</a:t>
+              <a:t>‹#›</a:t>
             </a:fld>
             <a:endParaRPr lang="en-US"/>
           </a:p>
@@ -12057,7 +12057,7 @@
             <a:fld id="{F5C857EE-8118-44C9-96A2-A0354AB2CE25}" type="datetime1">
               <a:rPr lang="en-US"/>
               <a:pPr lvl="0"/>
-              <a:t>9/26/2018</a:t>
+              <a:t>9/27/2018</a:t>
             </a:fld>
             <a:endParaRPr lang="en-US"/>
           </a:p>
@@ -12120,7 +12120,7 @@
           <a:p>
             <a:pPr lvl="0"/>
             <a:fld id="{10C71419-A28E-4A9B-A761-3F3555473157}" type="slidenum">
-              <a:t>‹N°›</a:t>
+              <a:t>‹#›</a:t>
             </a:fld>
             <a:endParaRPr lang="en-US"/>
           </a:p>
@@ -12303,7 +12303,7 @@
             <a:fld id="{3FFAC515-CA8B-46A8-986E-AE02294820F1}" type="datetime1">
               <a:rPr lang="en-US"/>
               <a:pPr lvl="0"/>
-              <a:t>9/26/2018</a:t>
+              <a:t>9/27/2018</a:t>
             </a:fld>
             <a:endParaRPr lang="en-US"/>
           </a:p>
@@ -12366,7 +12366,7 @@
           <a:p>
             <a:pPr lvl="0"/>
             <a:fld id="{597E352A-5B81-43B4-AD05-802D7001BA09}" type="slidenum">
-              <a:t>‹N°›</a:t>
+              <a:t>‹#›</a:t>
             </a:fld>
             <a:endParaRPr lang="en-US"/>
           </a:p>
@@ -12539,7 +12539,7 @@
             <a:fld id="{A7636D95-0A85-43AB-8B5E-7BFB476E9E43}" type="datetime1">
               <a:rPr lang="en-US"/>
               <a:pPr lvl="0"/>
-              <a:t>9/26/2018</a:t>
+              <a:t>9/27/2018</a:t>
             </a:fld>
             <a:endParaRPr lang="en-US"/>
           </a:p>
@@ -12602,7 +12602,7 @@
           <a:p>
             <a:pPr lvl="0"/>
             <a:fld id="{C7C6D198-2222-4D38-8268-878B721BE617}" type="slidenum">
-              <a:t>‹N°›</a:t>
+              <a:t>‹#›</a:t>
             </a:fld>
             <a:endParaRPr lang="en-US"/>
           </a:p>
@@ -12746,7 +12746,7 @@
             <a:fld id="{E70DF73D-2424-4DC7-8AC9-76825B634679}" type="datetime1">
               <a:rPr lang="en-US"/>
               <a:pPr lvl="0"/>
-              <a:t>9/26/2018</a:t>
+              <a:t>9/27/2018</a:t>
             </a:fld>
             <a:endParaRPr lang="en-US"/>
           </a:p>
@@ -12809,7 +12809,7 @@
           <a:p>
             <a:pPr lvl="0"/>
             <a:fld id="{A100C31C-904D-44AC-8659-79A55C7DD6C4}" type="slidenum">
-              <a:t>‹N°›</a:t>
+              <a:t>‹#›</a:t>
             </a:fld>
             <a:endParaRPr lang="en-US"/>
           </a:p>
@@ -13066,7 +13066,7 @@
             <a:fld id="{B89964D6-453C-45AB-86C6-D61C062AFE01}" type="datetime1">
               <a:rPr lang="en-US"/>
               <a:pPr lvl="0"/>
-              <a:t>9/26/2018</a:t>
+              <a:t>9/27/2018</a:t>
             </a:fld>
             <a:endParaRPr lang="en-US"/>
           </a:p>
@@ -13129,7 +13129,7 @@
           <a:p>
             <a:pPr lvl="0"/>
             <a:fld id="{48C40A34-AFE0-4D6B-A390-74BC092FFF0C}" type="slidenum">
-              <a:t>‹N°›</a:t>
+              <a:t>‹#›</a:t>
             </a:fld>
             <a:endParaRPr lang="en-US"/>
           </a:p>
@@ -13475,7 +13475,7 @@
             <a:fld id="{300D4A59-27B4-49C1-A96A-40932CAD7C6C}" type="datetime1">
               <a:rPr lang="en-US"/>
               <a:pPr lvl="0"/>
-              <a:t>9/26/2018</a:t>
+              <a:t>9/27/2018</a:t>
             </a:fld>
             <a:endParaRPr lang="en-US"/>
           </a:p>
@@ -13538,7 +13538,7 @@
           <a:p>
             <a:pPr lvl="0"/>
             <a:fld id="{437255F3-0BC6-45C6-9953-4BE35B5E4EB7}" type="slidenum">
-              <a:t>‹N°›</a:t>
+              <a:t>‹#›</a:t>
             </a:fld>
             <a:endParaRPr lang="en-US"/>
           </a:p>
@@ -13637,7 +13637,7 @@
             <a:fld id="{1419E80A-76A0-43CB-AA37-829ACB310706}" type="datetime1">
               <a:rPr lang="en-US"/>
               <a:pPr lvl="0"/>
-              <a:t>9/26/2018</a:t>
+              <a:t>9/27/2018</a:t>
             </a:fld>
             <a:endParaRPr lang="en-US"/>
           </a:p>
@@ -13700,7 +13700,7 @@
           <a:p>
             <a:pPr lvl="0"/>
             <a:fld id="{81992EB0-9767-4BED-9AA5-AF1115085CCD}" type="slidenum">
-              <a:t>‹N°›</a:t>
+              <a:t>‹#›</a:t>
             </a:fld>
             <a:endParaRPr lang="en-US"/>
           </a:p>
@@ -13765,7 +13765,7 @@
             <a:fld id="{546E3E38-83B7-4185-99D6-0C9F0F5FA8FF}" type="datetime1">
               <a:rPr lang="en-US"/>
               <a:pPr lvl="0"/>
-              <a:t>9/26/2018</a:t>
+              <a:t>9/27/2018</a:t>
             </a:fld>
             <a:endParaRPr lang="en-US"/>
           </a:p>
@@ -13828,7 +13828,7 @@
           <a:p>
             <a:pPr lvl="0"/>
             <a:fld id="{CFC7EE9C-FB97-4E0B-98EA-D0A605A18797}" type="slidenum">
-              <a:t>‹N°›</a:t>
+              <a:t>‹#›</a:t>
             </a:fld>
             <a:endParaRPr lang="en-US"/>
           </a:p>
@@ -14050,7 +14050,7 @@
             <a:fld id="{1148126F-FA85-4698-B709-D1394FC668AA}" type="datetime1">
               <a:rPr lang="en-US"/>
               <a:pPr lvl="0"/>
-              <a:t>9/26/2018</a:t>
+              <a:t>9/27/2018</a:t>
             </a:fld>
             <a:endParaRPr lang="en-US"/>
           </a:p>
@@ -14113,7 +14113,7 @@
           <a:p>
             <a:pPr lvl="0"/>
             <a:fld id="{D9205E9D-4690-413D-AB72-025442A9CA62}" type="slidenum">
-              <a:t>‹N°›</a:t>
+              <a:t>‹#›</a:t>
             </a:fld>
             <a:endParaRPr lang="en-US"/>
           </a:p>
@@ -14312,7 +14312,7 @@
             <a:fld id="{0C22758E-EC56-40D5-AB41-E3B8081732FE}" type="datetime1">
               <a:rPr lang="en-US"/>
               <a:pPr lvl="0"/>
-              <a:t>9/26/2018</a:t>
+              <a:t>9/27/2018</a:t>
             </a:fld>
             <a:endParaRPr lang="en-US"/>
           </a:p>
@@ -14375,7 +14375,7 @@
           <a:p>
             <a:pPr lvl="0"/>
             <a:fld id="{6D2CF1AF-5858-4C76-937C-4911768E4D4B}" type="slidenum">
-              <a:t>‹N°›</a:t>
+              <a:t>‹#›</a:t>
             </a:fld>
             <a:endParaRPr lang="en-US"/>
           </a:p>
@@ -20245,7 +20245,7 @@
             <a:fld id="{26B57F03-96DB-475D-99D7-3BC3E6188890}" type="datetime1">
               <a:rPr lang="en-US"/>
               <a:pPr lvl="0"/>
-              <a:t>9/26/2018</a:t>
+              <a:t>9/27/2018</a:t>
             </a:fld>
             <a:endParaRPr lang="en-US"/>
           </a:p>
@@ -20370,7 +20370,7 @@
           <a:p>
             <a:pPr lvl="0"/>
             <a:fld id="{0BD98321-72D3-4D8D-9C3C-302B41F6359E}" type="slidenum">
-              <a:t>‹N°›</a:t>
+              <a:t>‹#›</a:t>
             </a:fld>
             <a:endParaRPr lang="en-US"/>
           </a:p>
@@ -20806,7 +20806,7 @@
             </a:pPr>
             <a:r>
               <a:rPr lang="it-IT" sz="2800"/>
-              <a:t>CTD401 – Group 1</a:t>
+              <a:t>CDT401 – Group 1</a:t>
             </a:r>
           </a:p>
         </p:txBody>
@@ -24393,6 +24393,12 @@
 </file>
 
 <file path=customXml/item1.xml><?xml version="1.0" encoding="utf-8"?>
+<p:properties xmlns:p="http://schemas.microsoft.com/office/2006/metadata/properties" xmlns:xsi="http://www.w3.org/2001/XMLSchema-instance" xmlns:pc="http://schemas.microsoft.com/office/infopath/2007/PartnerControls">
+  <documentManagement/>
+</p:properties>
+</file>
+
+<file path=customXml/item2.xml><?xml version="1.0" encoding="utf-8"?>
 <ct:contentTypeSchema xmlns:ct="http://schemas.microsoft.com/office/2006/metadata/contentType" xmlns:ma="http://schemas.microsoft.com/office/2006/metadata/properties/metaAttributes" ct:_="" ma:_="" ma:contentTypeName="Document" ma:contentTypeID="0x0101009FC9B7818685AC4C8BF1C5D803D22D38" ma:contentTypeVersion="2" ma:contentTypeDescription="Crée un document." ma:contentTypeScope="" ma:versionID="cb68dd8e055ad4c6411dc2f1c87e9e48">
   <xsd:schema xmlns:xsd="http://www.w3.org/2001/XMLSchema" xmlns:xs="http://www.w3.org/2001/XMLSchema" xmlns:p="http://schemas.microsoft.com/office/2006/metadata/properties" xmlns:ns2="bede0427-9fc0-4912-bf84-71ad09034475" targetNamespace="http://schemas.microsoft.com/office/2006/metadata/properties" ma:root="true" ma:fieldsID="c9c817186c1bd5d0b9a53fcb4a31587d" ns2:_="">
     <xsd:import namespace="bede0427-9fc0-4912-bf84-71ad09034475"/>
@@ -24524,12 +24530,6 @@
 </ct:contentTypeSchema>
 </file>
 
-<file path=customXml/item2.xml><?xml version="1.0" encoding="utf-8"?>
-<p:properties xmlns:p="http://schemas.microsoft.com/office/2006/metadata/properties" xmlns:xsi="http://www.w3.org/2001/XMLSchema-instance" xmlns:pc="http://schemas.microsoft.com/office/infopath/2007/PartnerControls">
-  <documentManagement/>
-</p:properties>
-</file>
-
 <file path=customXml/item3.xml><?xml version="1.0" encoding="utf-8"?>
 <?mso-contentType ?>
 <FormTemplates xmlns="http://schemas.microsoft.com/sharepoint/v3/contenttype/forms">
@@ -24540,14 +24540,28 @@
 </file>
 
 <file path=customXml/itemProps1.xml><?xml version="1.0" encoding="utf-8"?>
-<ds:datastoreItem xmlns:ds="http://schemas.openxmlformats.org/officeDocument/2006/customXml" ds:itemID="{D7E4A0BC-F913-442E-81E2-A1E5204B9889}"/>
-</file>
-
-<file path=customXml/itemProps2.xml><?xml version="1.0" encoding="utf-8"?>
 <ds:datastoreItem xmlns:ds="http://schemas.openxmlformats.org/officeDocument/2006/customXml" ds:itemID="{FBE1AEF8-C494-42D0-9A55-6A11213FFCB0}">
   <ds:schemaRefs>
     <ds:schemaRef ds:uri="http://schemas.microsoft.com/office/2006/metadata/properties"/>
     <ds:schemaRef ds:uri="http://schemas.microsoft.com/office/infopath/2007/PartnerControls"/>
+  </ds:schemaRefs>
+</ds:datastoreItem>
+</file>
+
+<file path=customXml/itemProps2.xml><?xml version="1.0" encoding="utf-8"?>
+<ds:datastoreItem xmlns:ds="http://schemas.openxmlformats.org/officeDocument/2006/customXml" ds:itemID="{D7E4A0BC-F913-442E-81E2-A1E5204B9889}">
+  <ds:schemaRefs>
+    <ds:schemaRef ds:uri="http://schemas.microsoft.com/office/2006/metadata/contentType"/>
+    <ds:schemaRef ds:uri="http://schemas.microsoft.com/office/2006/metadata/properties/metaAttributes"/>
+    <ds:schemaRef ds:uri="http://www.w3.org/2001/XMLSchema"/>
+    <ds:schemaRef ds:uri="http://schemas.microsoft.com/office/2006/metadata/properties"/>
+    <ds:schemaRef ds:uri="bede0427-9fc0-4912-bf84-71ad09034475"/>
+    <ds:schemaRef ds:uri="http://schemas.microsoft.com/office/2006/documentManagement/types"/>
+    <ds:schemaRef ds:uri="http://schemas.microsoft.com/office/infopath/2007/PartnerControls"/>
+    <ds:schemaRef ds:uri="http://schemas.openxmlformats.org/package/2006/metadata/core-properties"/>
+    <ds:schemaRef ds:uri="http://purl.org/dc/elements/1.1/"/>
+    <ds:schemaRef ds:uri="http://purl.org/dc/terms/"/>
+    <ds:schemaRef ds:uri="http://schemas.microsoft.com/internal/obd"/>
   </ds:schemaRefs>
 </ds:datastoreItem>
 </file>

</xml_diff>